<commit_message>
edit kodu, dokumentace a prezentace(.pptx)
</commit_message>
<xml_diff>
--- a/23ReisiegelJPresentation.pptx
+++ b/23ReisiegelJPresentation.pptx
@@ -280,7 +280,7 @@
             <a:fld id="{87DE6118-2437-4B30-8E3C-4D2BE6020583}" type="datetimeFigureOut">
               <a:rPr lang="en-US" dirty="0"/>
               <a:pPr/>
-              <a:t>12/20/2022</a:t>
+              <a:t>12/22/2022</a:t>
             </a:fld>
             <a:endParaRPr lang="en-US" dirty="0"/>
           </a:p>
@@ -606,7 +606,7 @@
           <a:p>
             <a:fld id="{87DE6118-2437-4B30-8E3C-4D2BE6020583}" type="datetimeFigureOut">
               <a:rPr lang="en-US" dirty="0"/>
-              <a:t>12/20/2022</a:t>
+              <a:t>12/22/2022</a:t>
             </a:fld>
             <a:endParaRPr lang="en-US" dirty="0"/>
           </a:p>
@@ -781,7 +781,7 @@
           <a:p>
             <a:fld id="{87DE6118-2437-4B30-8E3C-4D2BE6020583}" type="datetimeFigureOut">
               <a:rPr lang="en-US" dirty="0"/>
-              <a:t>12/20/2022</a:t>
+              <a:t>12/22/2022</a:t>
             </a:fld>
             <a:endParaRPr lang="en-US" dirty="0"/>
           </a:p>
@@ -946,7 +946,7 @@
           <a:p>
             <a:fld id="{87DE6118-2437-4B30-8E3C-4D2BE6020583}" type="datetimeFigureOut">
               <a:rPr lang="en-US" dirty="0"/>
-              <a:t>12/20/2022</a:t>
+              <a:t>12/22/2022</a:t>
             </a:fld>
             <a:endParaRPr lang="en-US" dirty="0"/>
           </a:p>
@@ -1214,7 +1214,7 @@
             <a:fld id="{87DE6118-2437-4B30-8E3C-4D2BE6020583}" type="datetimeFigureOut">
               <a:rPr lang="en-US" dirty="0"/>
               <a:pPr/>
-              <a:t>12/20/2022</a:t>
+              <a:t>12/22/2022</a:t>
             </a:fld>
             <a:endParaRPr lang="en-US" dirty="0"/>
           </a:p>
@@ -1604,7 +1604,7 @@
           <a:p>
             <a:fld id="{87DE6118-2437-4B30-8E3C-4D2BE6020583}" type="datetimeFigureOut">
               <a:rPr lang="en-US" dirty="0"/>
-              <a:t>12/20/2022</a:t>
+              <a:t>12/22/2022</a:t>
             </a:fld>
             <a:endParaRPr lang="en-US" dirty="0"/>
           </a:p>
@@ -2076,7 +2076,7 @@
           <a:p>
             <a:fld id="{87DE6118-2437-4B30-8E3C-4D2BE6020583}" type="datetimeFigureOut">
               <a:rPr lang="en-US" dirty="0"/>
-              <a:t>12/20/2022</a:t>
+              <a:t>12/22/2022</a:t>
             </a:fld>
             <a:endParaRPr lang="en-US" dirty="0"/>
           </a:p>
@@ -2189,7 +2189,7 @@
           <a:p>
             <a:fld id="{87DE6118-2437-4B30-8E3C-4D2BE6020583}" type="datetimeFigureOut">
               <a:rPr lang="en-US" dirty="0"/>
-              <a:t>12/20/2022</a:t>
+              <a:t>12/22/2022</a:t>
             </a:fld>
             <a:endParaRPr lang="en-US" dirty="0"/>
           </a:p>
@@ -2279,7 +2279,7 @@
           <a:p>
             <a:fld id="{87DE6118-2437-4B30-8E3C-4D2BE6020583}" type="datetimeFigureOut">
               <a:rPr lang="en-US" dirty="0"/>
-              <a:t>12/20/2022</a:t>
+              <a:t>12/22/2022</a:t>
             </a:fld>
             <a:endParaRPr lang="en-US" dirty="0"/>
           </a:p>
@@ -2621,7 +2621,7 @@
             <a:fld id="{87DE6118-2437-4B30-8E3C-4D2BE6020583}" type="datetimeFigureOut">
               <a:rPr lang="en-US" dirty="0"/>
               <a:pPr/>
-              <a:t>12/20/2022</a:t>
+              <a:t>12/22/2022</a:t>
             </a:fld>
             <a:endParaRPr lang="en-US" dirty="0"/>
           </a:p>
@@ -3006,7 +3006,7 @@
             <a:fld id="{87DE6118-2437-4B30-8E3C-4D2BE6020583}" type="datetimeFigureOut">
               <a:rPr lang="en-US" dirty="0"/>
               <a:pPr/>
-              <a:t>12/20/2022</a:t>
+              <a:t>12/22/2022</a:t>
             </a:fld>
             <a:endParaRPr lang="en-US" dirty="0"/>
           </a:p>
@@ -3278,7 +3278,7 @@
             <a:fld id="{87DE6118-2437-4B30-8E3C-4D2BE6020583}" type="datetimeFigureOut">
               <a:rPr lang="en-US" dirty="0"/>
               <a:pPr/>
-              <a:t>12/20/2022</a:t>
+              <a:t>12/22/2022</a:t>
             </a:fld>
             <a:endParaRPr lang="en-US" dirty="0"/>
           </a:p>
@@ -4137,14 +4137,13 @@
         </p:nvPicPr>
         <p:blipFill>
           <a:blip r:embed="rId2"/>
-          <a:stretch>
-            <a:fillRect/>
-          </a:stretch>
+          <a:srcRect/>
+          <a:stretch/>
         </p:blipFill>
         <p:spPr>
           <a:xfrm>
-            <a:off x="1732166" y="1482573"/>
-            <a:ext cx="8727667" cy="4602854"/>
+            <a:off x="2028601" y="1482573"/>
+            <a:ext cx="8134797" cy="4602854"/>
           </a:xfrm>
         </p:spPr>
       </p:pic>

</xml_diff>